<commit_message>
- major updates on theory, analyses, and osm
</commit_message>
<xml_diff>
--- a/figures/design/figures.pptx
+++ b/figures/design/figures.pptx
@@ -212,7 +212,7 @@
           <a:p>
             <a:fld id="{78BA78C5-57D8-49BE-BB24-DC4B29DC180C}" type="datetimeFigureOut">
               <a:rPr lang="en-US" smtClean="0"/>
-              <a:t>3/20/2020</a:t>
+              <a:t>4/2/2020</a:t>
             </a:fld>
             <a:endParaRPr lang="en-US"/>
           </a:p>
@@ -276,35 +276,35 @@
           <a:p>
             <a:pPr lvl="0"/>
             <a:r>
-              <a:rPr lang="de-DE" smtClean="0"/>
+              <a:rPr lang="de-DE"/>
               <a:t>Formatvorlagen des Textmasters bearbeiten</a:t>
             </a:r>
           </a:p>
           <a:p>
             <a:pPr lvl="1"/>
             <a:r>
-              <a:rPr lang="de-DE" smtClean="0"/>
+              <a:rPr lang="de-DE"/>
               <a:t>Zweite Ebene</a:t>
             </a:r>
           </a:p>
           <a:p>
             <a:pPr lvl="2"/>
             <a:r>
-              <a:rPr lang="de-DE" smtClean="0"/>
+              <a:rPr lang="de-DE"/>
               <a:t>Dritte Ebene</a:t>
             </a:r>
           </a:p>
           <a:p>
             <a:pPr lvl="3"/>
             <a:r>
-              <a:rPr lang="de-DE" smtClean="0"/>
+              <a:rPr lang="de-DE"/>
               <a:t>Vierte Ebene</a:t>
             </a:r>
           </a:p>
           <a:p>
             <a:pPr lvl="4"/>
             <a:r>
-              <a:rPr lang="de-DE" smtClean="0"/>
+              <a:rPr lang="de-DE"/>
               <a:t>Fünfte Ebene</a:t>
             </a:r>
             <a:endParaRPr lang="en-US"/>
@@ -525,15 +525,15 @@
           <a:lstStyle/>
           <a:p>
             <a:r>
-              <a:rPr lang="de-DE" dirty="0" err="1" smtClean="0"/>
+              <a:rPr lang="de-DE" dirty="0" err="1"/>
               <a:t>Visualization</a:t>
             </a:r>
             <a:r>
-              <a:rPr lang="de-DE" dirty="0" smtClean="0"/>
+              <a:rPr lang="de-DE" dirty="0"/>
               <a:t>: As </a:t>
             </a:r>
             <a:r>
-              <a:rPr lang="de-DE" dirty="0" err="1" smtClean="0"/>
+              <a:rPr lang="de-DE" dirty="0" err="1"/>
               <a:t>presented</a:t>
             </a:r>
             <a:endParaRPr lang="en-US" dirty="0"/>
@@ -621,15 +621,15 @@
           <a:lstStyle/>
           <a:p>
             <a:r>
-              <a:rPr lang="de-DE" dirty="0" err="1" smtClean="0"/>
+              <a:rPr lang="de-DE" dirty="0" err="1"/>
               <a:t>Visualization</a:t>
             </a:r>
             <a:r>
-              <a:rPr lang="de-DE" dirty="0" smtClean="0"/>
+              <a:rPr lang="de-DE" dirty="0"/>
               <a:t>: As </a:t>
             </a:r>
             <a:r>
-              <a:rPr lang="de-DE" dirty="0" err="1" smtClean="0"/>
+              <a:rPr lang="de-DE" dirty="0" err="1"/>
               <a:t>presented</a:t>
             </a:r>
             <a:endParaRPr lang="en-US" dirty="0"/>
@@ -717,15 +717,15 @@
           <a:lstStyle/>
           <a:p>
             <a:r>
-              <a:rPr lang="de-DE" dirty="0" err="1" smtClean="0"/>
+              <a:rPr lang="de-DE" dirty="0" err="1"/>
               <a:t>Visualization</a:t>
             </a:r>
             <a:r>
-              <a:rPr lang="de-DE" dirty="0" smtClean="0"/>
+              <a:rPr lang="de-DE" dirty="0"/>
               <a:t>: As </a:t>
             </a:r>
             <a:r>
-              <a:rPr lang="de-DE" dirty="0" err="1" smtClean="0"/>
+              <a:rPr lang="de-DE" dirty="0" err="1"/>
               <a:t>presented</a:t>
             </a:r>
             <a:endParaRPr lang="en-US" dirty="0"/>
@@ -813,15 +813,15 @@
           <a:lstStyle/>
           <a:p>
             <a:r>
-              <a:rPr lang="de-DE" dirty="0" err="1" smtClean="0"/>
+              <a:rPr lang="de-DE" dirty="0" err="1"/>
               <a:t>Visualization</a:t>
             </a:r>
             <a:r>
-              <a:rPr lang="de-DE" dirty="0" smtClean="0"/>
+              <a:rPr lang="de-DE" dirty="0"/>
               <a:t>: As </a:t>
             </a:r>
             <a:r>
-              <a:rPr lang="de-DE" dirty="0" err="1" smtClean="0"/>
+              <a:rPr lang="de-DE" dirty="0" err="1"/>
               <a:t>presented</a:t>
             </a:r>
             <a:endParaRPr lang="en-US" dirty="0"/>
@@ -909,15 +909,15 @@
           <a:lstStyle/>
           <a:p>
             <a:r>
-              <a:rPr lang="de-DE" dirty="0" err="1" smtClean="0"/>
+              <a:rPr lang="de-DE" dirty="0" err="1"/>
               <a:t>Visualization</a:t>
             </a:r>
             <a:r>
-              <a:rPr lang="de-DE" dirty="0" smtClean="0"/>
+              <a:rPr lang="de-DE" dirty="0"/>
               <a:t>: As </a:t>
             </a:r>
             <a:r>
-              <a:rPr lang="de-DE" dirty="0" err="1" smtClean="0"/>
+              <a:rPr lang="de-DE" dirty="0" err="1"/>
               <a:t>presented</a:t>
             </a:r>
             <a:endParaRPr lang="en-US" dirty="0"/>
@@ -998,7 +998,7 @@
           <a:lstStyle/>
           <a:p>
             <a:r>
-              <a:rPr lang="de-DE" smtClean="0"/>
+              <a:rPr lang="de-DE"/>
               <a:t>Titelmasterformat durch Klicken bearbeiten</a:t>
             </a:r>
             <a:endParaRPr lang="en-US"/>
@@ -1117,7 +1117,7 @@
           </a:lstStyle>
           <a:p>
             <a:r>
-              <a:rPr lang="de-DE" smtClean="0"/>
+              <a:rPr lang="de-DE"/>
               <a:t>Formatvorlage des Untertitelmasters durch Klicken bearbeiten</a:t>
             </a:r>
             <a:endParaRPr lang="en-US"/>
@@ -1141,7 +1141,7 @@
           <a:p>
             <a:fld id="{43013845-1CAD-4FA4-895E-2F7E3757F8F9}" type="datetimeFigureOut">
               <a:rPr lang="en-US" smtClean="0"/>
-              <a:t>3/20/2020</a:t>
+              <a:t>4/2/2020</a:t>
             </a:fld>
             <a:endParaRPr lang="en-US"/>
           </a:p>
@@ -1235,7 +1235,7 @@
           <a:lstStyle/>
           <a:p>
             <a:r>
-              <a:rPr lang="de-DE" smtClean="0"/>
+              <a:rPr lang="de-DE"/>
               <a:t>Titelmasterformat durch Klicken bearbeiten</a:t>
             </a:r>
             <a:endParaRPr lang="en-US"/>
@@ -1259,35 +1259,35 @@
           <a:p>
             <a:pPr lvl="0"/>
             <a:r>
-              <a:rPr lang="de-DE" smtClean="0"/>
+              <a:rPr lang="de-DE"/>
               <a:t>Textmasterformat bearbeiten</a:t>
             </a:r>
           </a:p>
           <a:p>
             <a:pPr lvl="1"/>
             <a:r>
-              <a:rPr lang="de-DE" smtClean="0"/>
+              <a:rPr lang="de-DE"/>
               <a:t>Zweite Ebene</a:t>
             </a:r>
           </a:p>
           <a:p>
             <a:pPr lvl="2"/>
             <a:r>
-              <a:rPr lang="de-DE" smtClean="0"/>
+              <a:rPr lang="de-DE"/>
               <a:t>Dritte Ebene</a:t>
             </a:r>
           </a:p>
           <a:p>
             <a:pPr lvl="3"/>
             <a:r>
-              <a:rPr lang="de-DE" smtClean="0"/>
+              <a:rPr lang="de-DE"/>
               <a:t>Vierte Ebene</a:t>
             </a:r>
           </a:p>
           <a:p>
             <a:pPr lvl="4"/>
             <a:r>
-              <a:rPr lang="de-DE" smtClean="0"/>
+              <a:rPr lang="de-DE"/>
               <a:t>Fünfte Ebene</a:t>
             </a:r>
             <a:endParaRPr lang="en-US"/>
@@ -1311,7 +1311,7 @@
           <a:p>
             <a:fld id="{43013845-1CAD-4FA4-895E-2F7E3757F8F9}" type="datetimeFigureOut">
               <a:rPr lang="en-US" smtClean="0"/>
-              <a:t>3/20/2020</a:t>
+              <a:t>4/2/2020</a:t>
             </a:fld>
             <a:endParaRPr lang="en-US"/>
           </a:p>
@@ -1410,7 +1410,7 @@
           <a:lstStyle/>
           <a:p>
             <a:r>
-              <a:rPr lang="de-DE" smtClean="0"/>
+              <a:rPr lang="de-DE"/>
               <a:t>Titelmasterformat durch Klicken bearbeiten</a:t>
             </a:r>
             <a:endParaRPr lang="en-US"/>
@@ -1439,35 +1439,35 @@
           <a:p>
             <a:pPr lvl="0"/>
             <a:r>
-              <a:rPr lang="de-DE" smtClean="0"/>
+              <a:rPr lang="de-DE"/>
               <a:t>Textmasterformat bearbeiten</a:t>
             </a:r>
           </a:p>
           <a:p>
             <a:pPr lvl="1"/>
             <a:r>
-              <a:rPr lang="de-DE" smtClean="0"/>
+              <a:rPr lang="de-DE"/>
               <a:t>Zweite Ebene</a:t>
             </a:r>
           </a:p>
           <a:p>
             <a:pPr lvl="2"/>
             <a:r>
-              <a:rPr lang="de-DE" smtClean="0"/>
+              <a:rPr lang="de-DE"/>
               <a:t>Dritte Ebene</a:t>
             </a:r>
           </a:p>
           <a:p>
             <a:pPr lvl="3"/>
             <a:r>
-              <a:rPr lang="de-DE" smtClean="0"/>
+              <a:rPr lang="de-DE"/>
               <a:t>Vierte Ebene</a:t>
             </a:r>
           </a:p>
           <a:p>
             <a:pPr lvl="4"/>
             <a:r>
-              <a:rPr lang="de-DE" smtClean="0"/>
+              <a:rPr lang="de-DE"/>
               <a:t>Fünfte Ebene</a:t>
             </a:r>
             <a:endParaRPr lang="en-US"/>
@@ -1491,7 +1491,7 @@
           <a:p>
             <a:fld id="{43013845-1CAD-4FA4-895E-2F7E3757F8F9}" type="datetimeFigureOut">
               <a:rPr lang="en-US" smtClean="0"/>
-              <a:t>3/20/2020</a:t>
+              <a:t>4/2/2020</a:t>
             </a:fld>
             <a:endParaRPr lang="en-US"/>
           </a:p>
@@ -1585,7 +1585,7 @@
           <a:lstStyle/>
           <a:p>
             <a:r>
-              <a:rPr lang="de-DE" smtClean="0"/>
+              <a:rPr lang="de-DE"/>
               <a:t>Titelmasterformat durch Klicken bearbeiten</a:t>
             </a:r>
             <a:endParaRPr lang="en-US"/>
@@ -1609,35 +1609,35 @@
           <a:p>
             <a:pPr lvl="0"/>
             <a:r>
-              <a:rPr lang="de-DE" smtClean="0"/>
+              <a:rPr lang="de-DE"/>
               <a:t>Textmasterformat bearbeiten</a:t>
             </a:r>
           </a:p>
           <a:p>
             <a:pPr lvl="1"/>
             <a:r>
-              <a:rPr lang="de-DE" smtClean="0"/>
+              <a:rPr lang="de-DE"/>
               <a:t>Zweite Ebene</a:t>
             </a:r>
           </a:p>
           <a:p>
             <a:pPr lvl="2"/>
             <a:r>
-              <a:rPr lang="de-DE" smtClean="0"/>
+              <a:rPr lang="de-DE"/>
               <a:t>Dritte Ebene</a:t>
             </a:r>
           </a:p>
           <a:p>
             <a:pPr lvl="3"/>
             <a:r>
-              <a:rPr lang="de-DE" smtClean="0"/>
+              <a:rPr lang="de-DE"/>
               <a:t>Vierte Ebene</a:t>
             </a:r>
           </a:p>
           <a:p>
             <a:pPr lvl="4"/>
             <a:r>
-              <a:rPr lang="de-DE" smtClean="0"/>
+              <a:rPr lang="de-DE"/>
               <a:t>Fünfte Ebene</a:t>
             </a:r>
             <a:endParaRPr lang="en-US"/>
@@ -1661,7 +1661,7 @@
           <a:p>
             <a:fld id="{43013845-1CAD-4FA4-895E-2F7E3757F8F9}" type="datetimeFigureOut">
               <a:rPr lang="en-US" smtClean="0"/>
-              <a:t>3/20/2020</a:t>
+              <a:t>4/2/2020</a:t>
             </a:fld>
             <a:endParaRPr lang="en-US"/>
           </a:p>
@@ -1764,7 +1764,7 @@
           </a:lstStyle>
           <a:p>
             <a:r>
-              <a:rPr lang="de-DE" smtClean="0"/>
+              <a:rPr lang="de-DE"/>
               <a:t>Titelmasterformat durch Klicken bearbeiten</a:t>
             </a:r>
             <a:endParaRPr lang="en-US"/>
@@ -1884,7 +1884,7 @@
           <a:p>
             <a:pPr lvl="0"/>
             <a:r>
-              <a:rPr lang="de-DE" smtClean="0"/>
+              <a:rPr lang="de-DE"/>
               <a:t>Textmasterformat bearbeiten</a:t>
             </a:r>
           </a:p>
@@ -1907,7 +1907,7 @@
           <a:p>
             <a:fld id="{43013845-1CAD-4FA4-895E-2F7E3757F8F9}" type="datetimeFigureOut">
               <a:rPr lang="en-US" smtClean="0"/>
-              <a:t>3/20/2020</a:t>
+              <a:t>4/2/2020</a:t>
             </a:fld>
             <a:endParaRPr lang="en-US"/>
           </a:p>
@@ -2001,7 +2001,7 @@
           <a:lstStyle/>
           <a:p>
             <a:r>
-              <a:rPr lang="de-DE" smtClean="0"/>
+              <a:rPr lang="de-DE"/>
               <a:t>Titelmasterformat durch Klicken bearbeiten</a:t>
             </a:r>
             <a:endParaRPr lang="en-US"/>
@@ -2058,35 +2058,35 @@
           <a:p>
             <a:pPr lvl="0"/>
             <a:r>
-              <a:rPr lang="de-DE" smtClean="0"/>
+              <a:rPr lang="de-DE"/>
               <a:t>Textmasterformat bearbeiten</a:t>
             </a:r>
           </a:p>
           <a:p>
             <a:pPr lvl="1"/>
             <a:r>
-              <a:rPr lang="de-DE" smtClean="0"/>
+              <a:rPr lang="de-DE"/>
               <a:t>Zweite Ebene</a:t>
             </a:r>
           </a:p>
           <a:p>
             <a:pPr lvl="2"/>
             <a:r>
-              <a:rPr lang="de-DE" smtClean="0"/>
+              <a:rPr lang="de-DE"/>
               <a:t>Dritte Ebene</a:t>
             </a:r>
           </a:p>
           <a:p>
             <a:pPr lvl="3"/>
             <a:r>
-              <a:rPr lang="de-DE" smtClean="0"/>
+              <a:rPr lang="de-DE"/>
               <a:t>Vierte Ebene</a:t>
             </a:r>
           </a:p>
           <a:p>
             <a:pPr lvl="4"/>
             <a:r>
-              <a:rPr lang="de-DE" smtClean="0"/>
+              <a:rPr lang="de-DE"/>
               <a:t>Fünfte Ebene</a:t>
             </a:r>
             <a:endParaRPr lang="en-US"/>
@@ -2143,35 +2143,35 @@
           <a:p>
             <a:pPr lvl="0"/>
             <a:r>
-              <a:rPr lang="de-DE" smtClean="0"/>
+              <a:rPr lang="de-DE"/>
               <a:t>Textmasterformat bearbeiten</a:t>
             </a:r>
           </a:p>
           <a:p>
             <a:pPr lvl="1"/>
             <a:r>
-              <a:rPr lang="de-DE" smtClean="0"/>
+              <a:rPr lang="de-DE"/>
               <a:t>Zweite Ebene</a:t>
             </a:r>
           </a:p>
           <a:p>
             <a:pPr lvl="2"/>
             <a:r>
-              <a:rPr lang="de-DE" smtClean="0"/>
+              <a:rPr lang="de-DE"/>
               <a:t>Dritte Ebene</a:t>
             </a:r>
           </a:p>
           <a:p>
             <a:pPr lvl="3"/>
             <a:r>
-              <a:rPr lang="de-DE" smtClean="0"/>
+              <a:rPr lang="de-DE"/>
               <a:t>Vierte Ebene</a:t>
             </a:r>
           </a:p>
           <a:p>
             <a:pPr lvl="4"/>
             <a:r>
-              <a:rPr lang="de-DE" smtClean="0"/>
+              <a:rPr lang="de-DE"/>
               <a:t>Fünfte Ebene</a:t>
             </a:r>
             <a:endParaRPr lang="en-US"/>
@@ -2195,7 +2195,7 @@
           <a:p>
             <a:fld id="{43013845-1CAD-4FA4-895E-2F7E3757F8F9}" type="datetimeFigureOut">
               <a:rPr lang="en-US" smtClean="0"/>
-              <a:t>3/20/2020</a:t>
+              <a:t>4/2/2020</a:t>
             </a:fld>
             <a:endParaRPr lang="en-US"/>
           </a:p>
@@ -2293,7 +2293,7 @@
           </a:lstStyle>
           <a:p>
             <a:r>
-              <a:rPr lang="de-DE" smtClean="0"/>
+              <a:rPr lang="de-DE"/>
               <a:t>Titelmasterformat durch Klicken bearbeiten</a:t>
             </a:r>
             <a:endParaRPr lang="en-US"/>
@@ -2359,7 +2359,7 @@
           <a:p>
             <a:pPr lvl="0"/>
             <a:r>
-              <a:rPr lang="de-DE" smtClean="0"/>
+              <a:rPr lang="de-DE"/>
               <a:t>Textmasterformat bearbeiten</a:t>
             </a:r>
           </a:p>
@@ -2415,35 +2415,35 @@
           <a:p>
             <a:pPr lvl="0"/>
             <a:r>
-              <a:rPr lang="de-DE" smtClean="0"/>
+              <a:rPr lang="de-DE"/>
               <a:t>Textmasterformat bearbeiten</a:t>
             </a:r>
           </a:p>
           <a:p>
             <a:pPr lvl="1"/>
             <a:r>
-              <a:rPr lang="de-DE" smtClean="0"/>
+              <a:rPr lang="de-DE"/>
               <a:t>Zweite Ebene</a:t>
             </a:r>
           </a:p>
           <a:p>
             <a:pPr lvl="2"/>
             <a:r>
-              <a:rPr lang="de-DE" smtClean="0"/>
+              <a:rPr lang="de-DE"/>
               <a:t>Dritte Ebene</a:t>
             </a:r>
           </a:p>
           <a:p>
             <a:pPr lvl="3"/>
             <a:r>
-              <a:rPr lang="de-DE" smtClean="0"/>
+              <a:rPr lang="de-DE"/>
               <a:t>Vierte Ebene</a:t>
             </a:r>
           </a:p>
           <a:p>
             <a:pPr lvl="4"/>
             <a:r>
-              <a:rPr lang="de-DE" smtClean="0"/>
+              <a:rPr lang="de-DE"/>
               <a:t>Fünfte Ebene</a:t>
             </a:r>
             <a:endParaRPr lang="en-US"/>
@@ -2509,7 +2509,7 @@
           <a:p>
             <a:pPr lvl="0"/>
             <a:r>
-              <a:rPr lang="de-DE" smtClean="0"/>
+              <a:rPr lang="de-DE"/>
               <a:t>Textmasterformat bearbeiten</a:t>
             </a:r>
           </a:p>
@@ -2565,35 +2565,35 @@
           <a:p>
             <a:pPr lvl="0"/>
             <a:r>
-              <a:rPr lang="de-DE" smtClean="0"/>
+              <a:rPr lang="de-DE"/>
               <a:t>Textmasterformat bearbeiten</a:t>
             </a:r>
           </a:p>
           <a:p>
             <a:pPr lvl="1"/>
             <a:r>
-              <a:rPr lang="de-DE" smtClean="0"/>
+              <a:rPr lang="de-DE"/>
               <a:t>Zweite Ebene</a:t>
             </a:r>
           </a:p>
           <a:p>
             <a:pPr lvl="2"/>
             <a:r>
-              <a:rPr lang="de-DE" smtClean="0"/>
+              <a:rPr lang="de-DE"/>
               <a:t>Dritte Ebene</a:t>
             </a:r>
           </a:p>
           <a:p>
             <a:pPr lvl="3"/>
             <a:r>
-              <a:rPr lang="de-DE" smtClean="0"/>
+              <a:rPr lang="de-DE"/>
               <a:t>Vierte Ebene</a:t>
             </a:r>
           </a:p>
           <a:p>
             <a:pPr lvl="4"/>
             <a:r>
-              <a:rPr lang="de-DE" smtClean="0"/>
+              <a:rPr lang="de-DE"/>
               <a:t>Fünfte Ebene</a:t>
             </a:r>
             <a:endParaRPr lang="en-US"/>
@@ -2617,7 +2617,7 @@
           <a:p>
             <a:fld id="{43013845-1CAD-4FA4-895E-2F7E3757F8F9}" type="datetimeFigureOut">
               <a:rPr lang="en-US" smtClean="0"/>
-              <a:t>3/20/2020</a:t>
+              <a:t>4/2/2020</a:t>
             </a:fld>
             <a:endParaRPr lang="en-US"/>
           </a:p>
@@ -2711,7 +2711,7 @@
           <a:lstStyle/>
           <a:p>
             <a:r>
-              <a:rPr lang="de-DE" smtClean="0"/>
+              <a:rPr lang="de-DE"/>
               <a:t>Titelmasterformat durch Klicken bearbeiten</a:t>
             </a:r>
             <a:endParaRPr lang="en-US"/>
@@ -2735,7 +2735,7 @@
           <a:p>
             <a:fld id="{43013845-1CAD-4FA4-895E-2F7E3757F8F9}" type="datetimeFigureOut">
               <a:rPr lang="en-US" smtClean="0"/>
-              <a:t>3/20/2020</a:t>
+              <a:t>4/2/2020</a:t>
             </a:fld>
             <a:endParaRPr lang="en-US"/>
           </a:p>
@@ -2830,7 +2830,7 @@
           <a:p>
             <a:fld id="{43013845-1CAD-4FA4-895E-2F7E3757F8F9}" type="datetimeFigureOut">
               <a:rPr lang="en-US" smtClean="0"/>
-              <a:t>3/20/2020</a:t>
+              <a:t>4/2/2020</a:t>
             </a:fld>
             <a:endParaRPr lang="en-US"/>
           </a:p>
@@ -2933,7 +2933,7 @@
           </a:lstStyle>
           <a:p>
             <a:r>
-              <a:rPr lang="de-DE" smtClean="0"/>
+              <a:rPr lang="de-DE"/>
               <a:t>Titelmasterformat durch Klicken bearbeiten</a:t>
             </a:r>
             <a:endParaRPr lang="en-US"/>
@@ -2990,35 +2990,35 @@
           <a:p>
             <a:pPr lvl="0"/>
             <a:r>
-              <a:rPr lang="de-DE" smtClean="0"/>
+              <a:rPr lang="de-DE"/>
               <a:t>Textmasterformat bearbeiten</a:t>
             </a:r>
           </a:p>
           <a:p>
             <a:pPr lvl="1"/>
             <a:r>
-              <a:rPr lang="de-DE" smtClean="0"/>
+              <a:rPr lang="de-DE"/>
               <a:t>Zweite Ebene</a:t>
             </a:r>
           </a:p>
           <a:p>
             <a:pPr lvl="2"/>
             <a:r>
-              <a:rPr lang="de-DE" smtClean="0"/>
+              <a:rPr lang="de-DE"/>
               <a:t>Dritte Ebene</a:t>
             </a:r>
           </a:p>
           <a:p>
             <a:pPr lvl="3"/>
             <a:r>
-              <a:rPr lang="de-DE" smtClean="0"/>
+              <a:rPr lang="de-DE"/>
               <a:t>Vierte Ebene</a:t>
             </a:r>
           </a:p>
           <a:p>
             <a:pPr lvl="4"/>
             <a:r>
-              <a:rPr lang="de-DE" smtClean="0"/>
+              <a:rPr lang="de-DE"/>
               <a:t>Fünfte Ebene</a:t>
             </a:r>
             <a:endParaRPr lang="en-US"/>
@@ -3084,7 +3084,7 @@
           <a:p>
             <a:pPr lvl="0"/>
             <a:r>
-              <a:rPr lang="de-DE" smtClean="0"/>
+              <a:rPr lang="de-DE"/>
               <a:t>Textmasterformat bearbeiten</a:t>
             </a:r>
           </a:p>
@@ -3107,7 +3107,7 @@
           <a:p>
             <a:fld id="{43013845-1CAD-4FA4-895E-2F7E3757F8F9}" type="datetimeFigureOut">
               <a:rPr lang="en-US" smtClean="0"/>
-              <a:t>3/20/2020</a:t>
+              <a:t>4/2/2020</a:t>
             </a:fld>
             <a:endParaRPr lang="en-US"/>
           </a:p>
@@ -3210,7 +3210,7 @@
           </a:lstStyle>
           <a:p>
             <a:r>
-              <a:rPr lang="de-DE" smtClean="0"/>
+              <a:rPr lang="de-DE"/>
               <a:t>Titelmasterformat durch Klicken bearbeiten</a:t>
             </a:r>
             <a:endParaRPr lang="en-US"/>
@@ -3337,7 +3337,7 @@
           <a:p>
             <a:pPr lvl="0"/>
             <a:r>
-              <a:rPr lang="de-DE" smtClean="0"/>
+              <a:rPr lang="de-DE"/>
               <a:t>Textmasterformat bearbeiten</a:t>
             </a:r>
           </a:p>
@@ -3360,7 +3360,7 @@
           <a:p>
             <a:fld id="{43013845-1CAD-4FA4-895E-2F7E3757F8F9}" type="datetimeFigureOut">
               <a:rPr lang="en-US" smtClean="0"/>
-              <a:t>3/20/2020</a:t>
+              <a:t>4/2/2020</a:t>
             </a:fld>
             <a:endParaRPr lang="en-US"/>
           </a:p>
@@ -3469,7 +3469,7 @@
           <a:lstStyle/>
           <a:p>
             <a:r>
-              <a:rPr lang="de-DE" smtClean="0"/>
+              <a:rPr lang="de-DE"/>
               <a:t>Titelmasterformat durch Klicken bearbeiten</a:t>
             </a:r>
             <a:endParaRPr lang="en-US"/>
@@ -3503,35 +3503,35 @@
           <a:p>
             <a:pPr lvl="0"/>
             <a:r>
-              <a:rPr lang="de-DE" smtClean="0"/>
+              <a:rPr lang="de-DE"/>
               <a:t>Textmasterformat bearbeiten</a:t>
             </a:r>
           </a:p>
           <a:p>
             <a:pPr lvl="1"/>
             <a:r>
-              <a:rPr lang="de-DE" smtClean="0"/>
+              <a:rPr lang="de-DE"/>
               <a:t>Zweite Ebene</a:t>
             </a:r>
           </a:p>
           <a:p>
             <a:pPr lvl="2"/>
             <a:r>
-              <a:rPr lang="de-DE" smtClean="0"/>
+              <a:rPr lang="de-DE"/>
               <a:t>Dritte Ebene</a:t>
             </a:r>
           </a:p>
           <a:p>
             <a:pPr lvl="3"/>
             <a:r>
-              <a:rPr lang="de-DE" smtClean="0"/>
+              <a:rPr lang="de-DE"/>
               <a:t>Vierte Ebene</a:t>
             </a:r>
           </a:p>
           <a:p>
             <a:pPr lvl="4"/>
             <a:r>
-              <a:rPr lang="de-DE" smtClean="0"/>
+              <a:rPr lang="de-DE"/>
               <a:t>Fünfte Ebene</a:t>
             </a:r>
             <a:endParaRPr lang="en-US"/>
@@ -3573,7 +3573,7 @@
           <a:p>
             <a:fld id="{43013845-1CAD-4FA4-895E-2F7E3757F8F9}" type="datetimeFigureOut">
               <a:rPr lang="en-US" smtClean="0"/>
-              <a:t>3/20/2020</a:t>
+              <a:t>4/2/2020</a:t>
             </a:fld>
             <a:endParaRPr lang="en-US"/>
           </a:p>
@@ -4950,7 +4950,7 @@
           <a:p>
             <a:pPr algn="ctr"/>
             <a:r>
-              <a:rPr lang="en-US" sz="1200" dirty="0" smtClean="0">
+              <a:rPr lang="en-US" sz="1200" dirty="0">
                 <a:solidFill>
                   <a:schemeClr val="tx1"/>
                 </a:solidFill>
@@ -4959,13 +4959,6 @@
               </a:rPr>
               <a:t>Self-Disclosure</a:t>
             </a:r>
-            <a:endParaRPr lang="en-US" sz="1200" dirty="0">
-              <a:solidFill>
-                <a:schemeClr val="tx1"/>
-              </a:solidFill>
-              <a:latin typeface="Arial" panose="020B0604020202020204" pitchFamily="34" charset="0"/>
-              <a:cs typeface="Arial" panose="020B0604020202020204" pitchFamily="34" charset="0"/>
-            </a:endParaRPr>
           </a:p>
         </p:txBody>
       </p:sp>
@@ -5027,7 +5020,7 @@
           <a:p>
             <a:pPr algn="ctr"/>
             <a:r>
-              <a:rPr lang="en-US" sz="1200" dirty="0" smtClean="0">
+              <a:rPr lang="en-US" sz="1200" dirty="0">
                 <a:solidFill>
                   <a:schemeClr val="tx1"/>
                 </a:solidFill>
@@ -5036,13 +5029,6 @@
               </a:rPr>
               <a:t>Control</a:t>
             </a:r>
-            <a:endParaRPr lang="en-US" sz="1200" dirty="0">
-              <a:solidFill>
-                <a:schemeClr val="tx1"/>
-              </a:solidFill>
-              <a:latin typeface="Arial" panose="020B0604020202020204" pitchFamily="34" charset="0"/>
-              <a:cs typeface="Arial" panose="020B0604020202020204" pitchFamily="34" charset="0"/>
-            </a:endParaRPr>
           </a:p>
         </p:txBody>
       </p:sp>
@@ -5155,7 +5141,7 @@
           <a:p>
             <a:pPr algn="ctr"/>
             <a:r>
-              <a:rPr lang="de-DE" sz="1200" dirty="0" err="1" smtClean="0">
+              <a:rPr lang="de-DE" sz="1200" dirty="0" err="1">
                 <a:solidFill>
                   <a:schemeClr val="tx1"/>
                 </a:solidFill>
@@ -5214,7 +5200,7 @@
           </a:lstStyle>
           <a:p>
             <a:r>
-              <a:rPr lang="de-DE" dirty="0" smtClean="0"/>
+              <a:rPr lang="de-DE" dirty="0"/>
               <a:t>H5</a:t>
             </a:r>
             <a:endParaRPr lang="en-US" dirty="0"/>
@@ -5266,7 +5252,7 @@
           <a:p>
             <a:pPr algn="ctr"/>
             <a:r>
-              <a:rPr lang="de-DE" sz="1200" dirty="0" smtClean="0">
+              <a:rPr lang="de-DE" sz="1200" dirty="0">
                 <a:solidFill>
                   <a:schemeClr val="tx1"/>
                 </a:solidFill>
@@ -5276,7 +5262,7 @@
               <a:t>Privacy </a:t>
             </a:r>
             <a:r>
-              <a:rPr lang="de-DE" sz="1200" dirty="0" err="1" smtClean="0">
+              <a:rPr lang="de-DE" sz="1200" dirty="0" err="1">
                 <a:solidFill>
                   <a:schemeClr val="tx1"/>
                 </a:solidFill>
@@ -5340,7 +5326,7 @@
           <a:p>
             <a:pPr algn="ctr"/>
             <a:r>
-              <a:rPr lang="de-DE" sz="1200" dirty="0" smtClean="0">
+              <a:rPr lang="de-DE" sz="1200" dirty="0">
                 <a:solidFill>
                   <a:schemeClr val="tx1"/>
                 </a:solidFill>
@@ -5404,7 +5390,7 @@
           <a:p>
             <a:pPr algn="ctr"/>
             <a:r>
-              <a:rPr lang="de-DE" sz="1200" dirty="0" smtClean="0">
+              <a:rPr lang="de-DE" sz="1200" dirty="0">
                 <a:solidFill>
                   <a:schemeClr val="tx1"/>
                 </a:solidFill>
@@ -5414,7 +5400,7 @@
               <a:t>Communication </a:t>
             </a:r>
             <a:r>
-              <a:rPr lang="de-DE" sz="1200" dirty="0" err="1" smtClean="0">
+              <a:rPr lang="de-DE" sz="1200" dirty="0" err="1">
                 <a:solidFill>
                   <a:schemeClr val="tx1"/>
                 </a:solidFill>
@@ -5458,7 +5444,7 @@
           <a:lstStyle/>
           <a:p>
             <a:r>
-              <a:rPr lang="de-DE" sz="1200" dirty="0" smtClean="0"/>
+              <a:rPr lang="de-DE" sz="1200" dirty="0"/>
               <a:t>b1</a:t>
             </a:r>
             <a:endParaRPr lang="en-US" sz="1200" dirty="0"/>
@@ -5490,7 +5476,7 @@
           <a:lstStyle/>
           <a:p>
             <a:r>
-              <a:rPr lang="de-DE" sz="1200" dirty="0" smtClean="0"/>
+              <a:rPr lang="de-DE" sz="1200" dirty="0"/>
               <a:t>b5</a:t>
             </a:r>
             <a:endParaRPr lang="en-US" sz="1200" dirty="0"/>
@@ -5522,7 +5508,7 @@
           <a:lstStyle/>
           <a:p>
             <a:r>
-              <a:rPr lang="de-DE" sz="1200" dirty="0" smtClean="0"/>
+              <a:rPr lang="de-DE" sz="1200" dirty="0"/>
               <a:t>b4</a:t>
             </a:r>
             <a:endParaRPr lang="en-US" sz="1200" dirty="0"/>
@@ -5554,7 +5540,7 @@
           <a:lstStyle/>
           <a:p>
             <a:r>
-              <a:rPr lang="de-DE" sz="1200" dirty="0" smtClean="0"/>
+              <a:rPr lang="de-DE" sz="1200" dirty="0"/>
               <a:t>b3</a:t>
             </a:r>
             <a:endParaRPr lang="en-US" sz="1200" dirty="0"/>
@@ -5586,7 +5572,7 @@
           <a:lstStyle/>
           <a:p>
             <a:r>
-              <a:rPr lang="de-DE" sz="1200" dirty="0" smtClean="0"/>
+              <a:rPr lang="de-DE" sz="1200" dirty="0"/>
               <a:t>b2</a:t>
             </a:r>
             <a:endParaRPr lang="en-US" sz="1200" dirty="0"/>
@@ -5618,7 +5604,7 @@
           <a:lstStyle/>
           <a:p>
             <a:r>
-              <a:rPr lang="de-DE" sz="1200" dirty="0" smtClean="0"/>
+              <a:rPr lang="de-DE" sz="1200" dirty="0"/>
               <a:t>a2.1</a:t>
             </a:r>
             <a:endParaRPr lang="en-US" sz="1200" dirty="0"/>
@@ -5650,7 +5636,7 @@
           <a:lstStyle/>
           <a:p>
             <a:r>
-              <a:rPr lang="de-DE" sz="1200" dirty="0" smtClean="0"/>
+              <a:rPr lang="de-DE" sz="1200" dirty="0"/>
               <a:t>a2.3</a:t>
             </a:r>
             <a:endParaRPr lang="en-US" sz="1200" dirty="0"/>
@@ -5682,7 +5668,7 @@
           <a:lstStyle/>
           <a:p>
             <a:r>
-              <a:rPr lang="de-DE" sz="1200" dirty="0" smtClean="0"/>
+              <a:rPr lang="de-DE" sz="1200" dirty="0"/>
               <a:t>a2.2</a:t>
             </a:r>
             <a:endParaRPr lang="en-US" sz="1200" dirty="0"/>
@@ -5717,7 +5703,7 @@
           <a:lstStyle/>
           <a:p>
             <a:r>
-              <a:rPr lang="de-DE" sz="1200" dirty="0" smtClean="0"/>
+              <a:rPr lang="de-DE" sz="1200" dirty="0"/>
               <a:t>c1</a:t>
             </a:r>
             <a:endParaRPr lang="en-US" sz="1200" dirty="0"/>
@@ -5769,7 +5755,7 @@
           <a:p>
             <a:pPr algn="ctr"/>
             <a:r>
-              <a:rPr lang="en-US" sz="1200" dirty="0" smtClean="0">
+              <a:rPr lang="en-US" sz="1200" dirty="0">
                 <a:solidFill>
                   <a:schemeClr val="tx1"/>
                 </a:solidFill>
@@ -5782,7 +5768,7 @@
           <a:p>
             <a:pPr algn="ctr"/>
             <a:r>
-              <a:rPr lang="en-US" sz="1200" dirty="0" smtClean="0">
+              <a:rPr lang="en-US" sz="1200" dirty="0">
                 <a:solidFill>
                   <a:schemeClr val="tx1"/>
                 </a:solidFill>
@@ -5791,13 +5777,6 @@
               </a:rPr>
               <a:t>Control</a:t>
             </a:r>
-            <a:endParaRPr lang="en-US" sz="1200" dirty="0">
-              <a:solidFill>
-                <a:schemeClr val="tx1"/>
-              </a:solidFill>
-              <a:latin typeface="Arial" panose="020B0604020202020204" pitchFamily="34" charset="0"/>
-              <a:cs typeface="Arial" panose="020B0604020202020204" pitchFamily="34" charset="0"/>
-            </a:endParaRPr>
           </a:p>
         </p:txBody>
       </p:sp>
@@ -5859,7 +5838,7 @@
           <a:p>
             <a:pPr algn="ctr"/>
             <a:r>
-              <a:rPr lang="en-US" sz="1200" dirty="0" smtClean="0">
+              <a:rPr lang="en-US" sz="1200" dirty="0">
                 <a:solidFill>
                   <a:schemeClr val="tx1"/>
                 </a:solidFill>
@@ -5872,7 +5851,7 @@
           <a:p>
             <a:pPr algn="ctr"/>
             <a:r>
-              <a:rPr lang="en-US" sz="1200" dirty="0" smtClean="0">
+              <a:rPr lang="en-US" sz="1200" dirty="0">
                 <a:solidFill>
                   <a:schemeClr val="tx1"/>
                 </a:solidFill>
@@ -5881,13 +5860,6 @@
               </a:rPr>
               <a:t>Like Buttons</a:t>
             </a:r>
-            <a:endParaRPr lang="en-US" sz="1200" dirty="0">
-              <a:solidFill>
-                <a:schemeClr val="tx1"/>
-              </a:solidFill>
-              <a:latin typeface="Arial" panose="020B0604020202020204" pitchFamily="34" charset="0"/>
-              <a:cs typeface="Arial" panose="020B0604020202020204" pitchFamily="34" charset="0"/>
-            </a:endParaRPr>
           </a:p>
         </p:txBody>
       </p:sp>
@@ -5916,7 +5888,7 @@
           <a:lstStyle/>
           <a:p>
             <a:r>
-              <a:rPr lang="de-DE" sz="1200" dirty="0" smtClean="0"/>
+              <a:rPr lang="de-DE" sz="1200" dirty="0"/>
               <a:t>a3.1</a:t>
             </a:r>
             <a:endParaRPr lang="en-US" sz="1200" dirty="0"/>
@@ -5948,7 +5920,7 @@
           <a:lstStyle/>
           <a:p>
             <a:r>
-              <a:rPr lang="de-DE" sz="1200" dirty="0" smtClean="0"/>
+              <a:rPr lang="de-DE" sz="1200" dirty="0"/>
               <a:t>a3.3</a:t>
             </a:r>
             <a:endParaRPr lang="en-US" sz="1200" dirty="0"/>
@@ -5980,7 +5952,7 @@
           <a:lstStyle/>
           <a:p>
             <a:r>
-              <a:rPr lang="de-DE" sz="1200" dirty="0" smtClean="0"/>
+              <a:rPr lang="de-DE" sz="1200" dirty="0"/>
               <a:t>a3.2</a:t>
             </a:r>
             <a:endParaRPr lang="en-US" sz="1200" dirty="0"/>
@@ -6012,7 +5984,7 @@
           <a:lstStyle/>
           <a:p>
             <a:r>
-              <a:rPr lang="de-DE" sz="1200" dirty="0" smtClean="0"/>
+              <a:rPr lang="de-DE" sz="1200" dirty="0"/>
               <a:t>a1.3</a:t>
             </a:r>
             <a:endParaRPr lang="en-US" sz="1200" dirty="0"/>
@@ -6044,7 +6016,7 @@
           <a:lstStyle/>
           <a:p>
             <a:r>
-              <a:rPr lang="de-DE" sz="1200" dirty="0" smtClean="0"/>
+              <a:rPr lang="de-DE" sz="1200" dirty="0"/>
               <a:t>a1.1</a:t>
             </a:r>
             <a:endParaRPr lang="en-US" sz="1200" dirty="0"/>
@@ -6076,7 +6048,7 @@
           <a:lstStyle/>
           <a:p>
             <a:r>
-              <a:rPr lang="de-DE" sz="1200" dirty="0" smtClean="0"/>
+              <a:rPr lang="de-DE" sz="1200" dirty="0"/>
               <a:t>a1.2</a:t>
             </a:r>
             <a:endParaRPr lang="en-US" sz="1200" dirty="0"/>
@@ -6111,7 +6083,7 @@
           <a:lstStyle/>
           <a:p>
             <a:r>
-              <a:rPr lang="de-DE" sz="1200" dirty="0" smtClean="0"/>
+              <a:rPr lang="de-DE" sz="1200" dirty="0"/>
               <a:t>c2</a:t>
             </a:r>
             <a:endParaRPr lang="en-US" sz="1200" dirty="0"/>
@@ -6146,7 +6118,7 @@
           <a:lstStyle/>
           <a:p>
             <a:r>
-              <a:rPr lang="de-DE" sz="1200" dirty="0" smtClean="0"/>
+              <a:rPr lang="de-DE" sz="1200" dirty="0"/>
               <a:t>c3</a:t>
             </a:r>
             <a:endParaRPr lang="en-US" sz="1200" dirty="0"/>
@@ -6178,7 +6150,7 @@
           <a:lstStyle/>
           <a:p>
             <a:r>
-              <a:rPr lang="de-DE" sz="1200" dirty="0" smtClean="0"/>
+              <a:rPr lang="de-DE" sz="1200" dirty="0"/>
               <a:t>a1.4</a:t>
             </a:r>
             <a:endParaRPr lang="en-US" sz="1200" dirty="0"/>
@@ -6210,7 +6182,7 @@
           <a:lstStyle/>
           <a:p>
             <a:r>
-              <a:rPr lang="de-DE" sz="1200" dirty="0" smtClean="0"/>
+              <a:rPr lang="de-DE" sz="1200" dirty="0"/>
               <a:t>a2.4</a:t>
             </a:r>
             <a:endParaRPr lang="en-US" sz="1200" dirty="0"/>
@@ -6242,7 +6214,7 @@
           <a:lstStyle/>
           <a:p>
             <a:r>
-              <a:rPr lang="de-DE" sz="1200" dirty="0" smtClean="0"/>
+              <a:rPr lang="de-DE" sz="1200" dirty="0"/>
               <a:t>a3.4</a:t>
             </a:r>
             <a:endParaRPr lang="en-US" sz="1200" dirty="0"/>
@@ -6274,7 +6246,7 @@
           <a:lstStyle/>
           <a:p>
             <a:r>
-              <a:rPr lang="de-DE" sz="1200" dirty="0" smtClean="0"/>
+              <a:rPr lang="de-DE" sz="1200" dirty="0"/>
               <a:t>a3.5</a:t>
             </a:r>
             <a:endParaRPr lang="en-US" sz="1200" dirty="0"/>
@@ -6306,7 +6278,7 @@
           <a:lstStyle/>
           <a:p>
             <a:r>
-              <a:rPr lang="de-DE" sz="1200" dirty="0" smtClean="0"/>
+              <a:rPr lang="de-DE" sz="1200" dirty="0"/>
               <a:t>a2.5</a:t>
             </a:r>
             <a:endParaRPr lang="en-US" sz="1200" dirty="0"/>
@@ -6338,7 +6310,7 @@
           <a:lstStyle/>
           <a:p>
             <a:r>
-              <a:rPr lang="de-DE" sz="1200" dirty="0" smtClean="0"/>
+              <a:rPr lang="de-DE" sz="1200" dirty="0"/>
               <a:t>a1.5</a:t>
             </a:r>
             <a:endParaRPr lang="en-US" sz="1200" dirty="0"/>
@@ -6432,7 +6404,7 @@
             <a:lstStyle/>
             <a:p>
               <a:r>
-                <a:rPr lang="en-US" sz="1050" dirty="0" smtClean="0">
+                <a:rPr lang="en-US" sz="1050" dirty="0">
                   <a:solidFill>
                     <a:schemeClr val="tx1"/>
                   </a:solidFill>
@@ -6441,13 +6413,6 @@
                 </a:rPr>
                 <a:t>Positive Effect</a:t>
               </a:r>
-              <a:endParaRPr lang="en-US" sz="1050" dirty="0">
-                <a:solidFill>
-                  <a:schemeClr val="tx1"/>
-                </a:solidFill>
-                <a:latin typeface="Arial" panose="020B0604020202020204" pitchFamily="34" charset="0"/>
-                <a:cs typeface="Arial" panose="020B0604020202020204" pitchFamily="34" charset="0"/>
-              </a:endParaRPr>
             </a:p>
           </p:txBody>
         </p:sp>
@@ -6540,7 +6505,7 @@
             <a:lstStyle/>
             <a:p>
               <a:r>
-                <a:rPr lang="en-US" sz="1050" dirty="0" smtClean="0">
+                <a:rPr lang="en-US" sz="1050" dirty="0">
                   <a:solidFill>
                     <a:schemeClr val="tx1"/>
                   </a:solidFill>
@@ -6549,13 +6514,6 @@
                 </a:rPr>
                 <a:t>Negative Effect</a:t>
               </a:r>
-              <a:endParaRPr lang="en-US" sz="1050" dirty="0">
-                <a:solidFill>
-                  <a:schemeClr val="tx1"/>
-                </a:solidFill>
-                <a:latin typeface="Arial" panose="020B0604020202020204" pitchFamily="34" charset="0"/>
-                <a:cs typeface="Arial" panose="020B0604020202020204" pitchFamily="34" charset="0"/>
-              </a:endParaRPr>
             </a:p>
           </p:txBody>
         </p:sp>
@@ -6648,7 +6606,7 @@
             <a:lstStyle/>
             <a:p>
               <a:r>
-                <a:rPr lang="en-US" sz="1050" dirty="0" smtClean="0">
+                <a:rPr lang="en-US" sz="1050" dirty="0">
                   <a:solidFill>
                     <a:schemeClr val="tx1"/>
                   </a:solidFill>
@@ -6657,13 +6615,6 @@
                 </a:rPr>
                 <a:t>Research Question</a:t>
               </a:r>
-              <a:endParaRPr lang="en-US" sz="1050" dirty="0">
-                <a:solidFill>
-                  <a:schemeClr val="tx1"/>
-                </a:solidFill>
-                <a:latin typeface="Arial" panose="020B0604020202020204" pitchFamily="34" charset="0"/>
-                <a:cs typeface="Arial" panose="020B0604020202020204" pitchFamily="34" charset="0"/>
-              </a:endParaRPr>
             </a:p>
           </p:txBody>
         </p:sp>
@@ -6678,13 +6629,6 @@
   <p:clrMapOvr>
     <a:masterClrMapping/>
   </p:clrMapOvr>
-  <p:timing>
-    <p:tnLst>
-      <p:par>
-        <p:cTn id="1" dur="indefinite" restart="never" nodeType="tmRoot"/>
-      </p:par>
-    </p:tnLst>
-  </p:timing>
 </p:sld>
 </file>
 
@@ -7707,7 +7651,7 @@
           <a:p>
             <a:pPr algn="ctr"/>
             <a:r>
-              <a:rPr lang="en-US" sz="1200" dirty="0" smtClean="0">
+              <a:rPr lang="en-US" sz="1200" dirty="0">
                 <a:solidFill>
                   <a:schemeClr val="tx1"/>
                 </a:solidFill>
@@ -7716,13 +7660,6 @@
               </a:rPr>
               <a:t>Self-Disclosure</a:t>
             </a:r>
-            <a:endParaRPr lang="en-US" sz="1200" dirty="0">
-              <a:solidFill>
-                <a:schemeClr val="tx1"/>
-              </a:solidFill>
-              <a:latin typeface="Arial" panose="020B0604020202020204" pitchFamily="34" charset="0"/>
-              <a:cs typeface="Arial" panose="020B0604020202020204" pitchFamily="34" charset="0"/>
-            </a:endParaRPr>
           </a:p>
         </p:txBody>
       </p:sp>
@@ -7784,7 +7721,7 @@
           <a:p>
             <a:pPr algn="ctr"/>
             <a:r>
-              <a:rPr lang="en-US" sz="1200" dirty="0" smtClean="0">
+              <a:rPr lang="en-US" sz="1200" dirty="0">
                 <a:solidFill>
                   <a:schemeClr val="tx1"/>
                 </a:solidFill>
@@ -7793,13 +7730,6 @@
               </a:rPr>
               <a:t>Control</a:t>
             </a:r>
-            <a:endParaRPr lang="en-US" sz="1200" dirty="0">
-              <a:solidFill>
-                <a:schemeClr val="tx1"/>
-              </a:solidFill>
-              <a:latin typeface="Arial" panose="020B0604020202020204" pitchFamily="34" charset="0"/>
-              <a:cs typeface="Arial" panose="020B0604020202020204" pitchFamily="34" charset="0"/>
-            </a:endParaRPr>
           </a:p>
         </p:txBody>
       </p:sp>
@@ -7912,7 +7842,7 @@
           <a:p>
             <a:pPr algn="ctr"/>
             <a:r>
-              <a:rPr lang="de-DE" sz="1200" dirty="0" err="1" smtClean="0">
+              <a:rPr lang="de-DE" sz="1200" dirty="0" err="1">
                 <a:solidFill>
                   <a:schemeClr val="tx1"/>
                 </a:solidFill>
@@ -7971,7 +7901,7 @@
           </a:lstStyle>
           <a:p>
             <a:r>
-              <a:rPr lang="de-DE" dirty="0" smtClean="0"/>
+              <a:rPr lang="de-DE" dirty="0"/>
               <a:t>H5</a:t>
             </a:r>
             <a:endParaRPr lang="en-US" dirty="0"/>
@@ -8023,7 +7953,7 @@
           <a:p>
             <a:pPr algn="ctr"/>
             <a:r>
-              <a:rPr lang="de-DE" sz="1200" dirty="0" smtClean="0">
+              <a:rPr lang="de-DE" sz="1200" dirty="0">
                 <a:solidFill>
                   <a:schemeClr val="tx1"/>
                 </a:solidFill>
@@ -8033,7 +7963,7 @@
               <a:t>Privacy </a:t>
             </a:r>
             <a:r>
-              <a:rPr lang="de-DE" sz="1200" dirty="0" err="1" smtClean="0">
+              <a:rPr lang="de-DE" sz="1200" dirty="0" err="1">
                 <a:solidFill>
                   <a:schemeClr val="tx1"/>
                 </a:solidFill>
@@ -8097,7 +8027,7 @@
           <a:p>
             <a:pPr algn="ctr"/>
             <a:r>
-              <a:rPr lang="de-DE" sz="1200" dirty="0" smtClean="0">
+              <a:rPr lang="de-DE" sz="1200" dirty="0">
                 <a:solidFill>
                   <a:schemeClr val="tx1"/>
                 </a:solidFill>
@@ -8161,7 +8091,7 @@
           <a:p>
             <a:pPr algn="ctr"/>
             <a:r>
-              <a:rPr lang="de-DE" sz="1200" dirty="0" smtClean="0">
+              <a:rPr lang="de-DE" sz="1200" dirty="0">
                 <a:solidFill>
                   <a:schemeClr val="tx1"/>
                 </a:solidFill>
@@ -8171,7 +8101,7 @@
               <a:t>Communication </a:t>
             </a:r>
             <a:r>
-              <a:rPr lang="de-DE" sz="1200" dirty="0" err="1" smtClean="0">
+              <a:rPr lang="de-DE" sz="1200" dirty="0" err="1">
                 <a:solidFill>
                   <a:schemeClr val="tx1"/>
                 </a:solidFill>
@@ -8215,7 +8145,7 @@
           <a:lstStyle/>
           <a:p>
             <a:r>
-              <a:rPr lang="de-DE" sz="1200" dirty="0" smtClean="0"/>
+              <a:rPr lang="de-DE" sz="1200" dirty="0"/>
               <a:t>b1</a:t>
             </a:r>
             <a:endParaRPr lang="en-US" sz="1200" dirty="0"/>
@@ -8247,7 +8177,7 @@
           <a:lstStyle/>
           <a:p>
             <a:r>
-              <a:rPr lang="de-DE" sz="1200" dirty="0" smtClean="0"/>
+              <a:rPr lang="de-DE" sz="1200" dirty="0"/>
               <a:t>b5</a:t>
             </a:r>
             <a:endParaRPr lang="en-US" sz="1200" dirty="0"/>
@@ -8279,7 +8209,7 @@
           <a:lstStyle/>
           <a:p>
             <a:r>
-              <a:rPr lang="de-DE" sz="1200" dirty="0" smtClean="0"/>
+              <a:rPr lang="de-DE" sz="1200" dirty="0"/>
               <a:t>b4</a:t>
             </a:r>
             <a:endParaRPr lang="en-US" sz="1200" dirty="0"/>
@@ -8311,7 +8241,7 @@
           <a:lstStyle/>
           <a:p>
             <a:r>
-              <a:rPr lang="de-DE" sz="1200" dirty="0" smtClean="0"/>
+              <a:rPr lang="de-DE" sz="1200" dirty="0"/>
               <a:t>b3</a:t>
             </a:r>
             <a:endParaRPr lang="en-US" sz="1200" dirty="0"/>
@@ -8343,7 +8273,7 @@
           <a:lstStyle/>
           <a:p>
             <a:r>
-              <a:rPr lang="de-DE" sz="1200" dirty="0" smtClean="0"/>
+              <a:rPr lang="de-DE" sz="1200" dirty="0"/>
               <a:t>b2</a:t>
             </a:r>
             <a:endParaRPr lang="en-US" sz="1200" dirty="0"/>
@@ -8375,7 +8305,7 @@
           <a:lstStyle/>
           <a:p>
             <a:r>
-              <a:rPr lang="de-DE" sz="1200" dirty="0" smtClean="0"/>
+              <a:rPr lang="de-DE" sz="1200" dirty="0"/>
               <a:t>a2.1</a:t>
             </a:r>
             <a:endParaRPr lang="en-US" sz="1200" dirty="0"/>
@@ -8407,7 +8337,7 @@
           <a:lstStyle/>
           <a:p>
             <a:r>
-              <a:rPr lang="de-DE" sz="1200" dirty="0" smtClean="0"/>
+              <a:rPr lang="de-DE" sz="1200" dirty="0"/>
               <a:t>a2.3</a:t>
             </a:r>
             <a:endParaRPr lang="en-US" sz="1200" dirty="0"/>
@@ -8439,7 +8369,7 @@
           <a:lstStyle/>
           <a:p>
             <a:r>
-              <a:rPr lang="de-DE" sz="1200" dirty="0" smtClean="0"/>
+              <a:rPr lang="de-DE" sz="1200" dirty="0"/>
               <a:t>a2.2</a:t>
             </a:r>
             <a:endParaRPr lang="en-US" sz="1200" dirty="0"/>
@@ -8474,7 +8404,7 @@
           <a:lstStyle/>
           <a:p>
             <a:r>
-              <a:rPr lang="de-DE" sz="1200" dirty="0" smtClean="0"/>
+              <a:rPr lang="de-DE" sz="1200" dirty="0"/>
               <a:t>c1</a:t>
             </a:r>
             <a:endParaRPr lang="en-US" sz="1200" dirty="0"/>
@@ -8526,7 +8456,7 @@
           <a:p>
             <a:pPr algn="ctr"/>
             <a:r>
-              <a:rPr lang="en-US" sz="1200" dirty="0" smtClean="0">
+              <a:rPr lang="en-US" sz="1200" dirty="0">
                 <a:solidFill>
                   <a:schemeClr val="tx1"/>
                 </a:solidFill>
@@ -8539,7 +8469,7 @@
           <a:p>
             <a:pPr algn="ctr"/>
             <a:r>
-              <a:rPr lang="en-US" sz="1200" dirty="0" smtClean="0">
+              <a:rPr lang="en-US" sz="1200" dirty="0">
                 <a:solidFill>
                   <a:schemeClr val="tx1"/>
                 </a:solidFill>
@@ -8548,13 +8478,6 @@
               </a:rPr>
               <a:t>Control</a:t>
             </a:r>
-            <a:endParaRPr lang="en-US" sz="1200" dirty="0">
-              <a:solidFill>
-                <a:schemeClr val="tx1"/>
-              </a:solidFill>
-              <a:latin typeface="Arial" panose="020B0604020202020204" pitchFamily="34" charset="0"/>
-              <a:cs typeface="Arial" panose="020B0604020202020204" pitchFamily="34" charset="0"/>
-            </a:endParaRPr>
           </a:p>
         </p:txBody>
       </p:sp>
@@ -8616,7 +8539,7 @@
           <a:p>
             <a:pPr algn="ctr"/>
             <a:r>
-              <a:rPr lang="en-US" sz="1200" dirty="0" smtClean="0">
+              <a:rPr lang="en-US" sz="1200" dirty="0">
                 <a:solidFill>
                   <a:schemeClr val="tx1"/>
                 </a:solidFill>
@@ -8629,7 +8552,7 @@
           <a:p>
             <a:pPr algn="ctr"/>
             <a:r>
-              <a:rPr lang="en-US" sz="1200" dirty="0" smtClean="0">
+              <a:rPr lang="en-US" sz="1200" dirty="0">
                 <a:solidFill>
                   <a:schemeClr val="tx1"/>
                 </a:solidFill>
@@ -8638,13 +8561,6 @@
               </a:rPr>
               <a:t>Like Buttons</a:t>
             </a:r>
-            <a:endParaRPr lang="en-US" sz="1200" dirty="0">
-              <a:solidFill>
-                <a:schemeClr val="tx1"/>
-              </a:solidFill>
-              <a:latin typeface="Arial" panose="020B0604020202020204" pitchFamily="34" charset="0"/>
-              <a:cs typeface="Arial" panose="020B0604020202020204" pitchFamily="34" charset="0"/>
-            </a:endParaRPr>
           </a:p>
         </p:txBody>
       </p:sp>
@@ -8673,7 +8589,7 @@
           <a:lstStyle/>
           <a:p>
             <a:r>
-              <a:rPr lang="de-DE" sz="1200" dirty="0" smtClean="0"/>
+              <a:rPr lang="de-DE" sz="1200" dirty="0"/>
               <a:t>a3.1</a:t>
             </a:r>
             <a:endParaRPr lang="en-US" sz="1200" dirty="0"/>
@@ -8705,7 +8621,7 @@
           <a:lstStyle/>
           <a:p>
             <a:r>
-              <a:rPr lang="de-DE" sz="1200" dirty="0" smtClean="0"/>
+              <a:rPr lang="de-DE" sz="1200" dirty="0"/>
               <a:t>a3.3</a:t>
             </a:r>
             <a:endParaRPr lang="en-US" sz="1200" dirty="0"/>
@@ -8737,7 +8653,7 @@
           <a:lstStyle/>
           <a:p>
             <a:r>
-              <a:rPr lang="de-DE" sz="1200" dirty="0" smtClean="0"/>
+              <a:rPr lang="de-DE" sz="1200" dirty="0"/>
               <a:t>a3.2</a:t>
             </a:r>
             <a:endParaRPr lang="en-US" sz="1200" dirty="0"/>
@@ -8769,7 +8685,7 @@
           <a:lstStyle/>
           <a:p>
             <a:r>
-              <a:rPr lang="de-DE" sz="1200" dirty="0" smtClean="0"/>
+              <a:rPr lang="de-DE" sz="1200" dirty="0"/>
               <a:t>a1.3</a:t>
             </a:r>
             <a:endParaRPr lang="en-US" sz="1200" dirty="0"/>
@@ -8801,7 +8717,7 @@
           <a:lstStyle/>
           <a:p>
             <a:r>
-              <a:rPr lang="de-DE" sz="1200" dirty="0" smtClean="0"/>
+              <a:rPr lang="de-DE" sz="1200" dirty="0"/>
               <a:t>a1.1</a:t>
             </a:r>
             <a:endParaRPr lang="en-US" sz="1200" dirty="0"/>
@@ -8833,7 +8749,7 @@
           <a:lstStyle/>
           <a:p>
             <a:r>
-              <a:rPr lang="de-DE" sz="1200" dirty="0" smtClean="0"/>
+              <a:rPr lang="de-DE" sz="1200" dirty="0"/>
               <a:t>a1.2</a:t>
             </a:r>
             <a:endParaRPr lang="en-US" sz="1200" dirty="0"/>
@@ -8868,7 +8784,7 @@
           <a:lstStyle/>
           <a:p>
             <a:r>
-              <a:rPr lang="de-DE" sz="1200" dirty="0" smtClean="0"/>
+              <a:rPr lang="de-DE" sz="1200" dirty="0"/>
               <a:t>c2</a:t>
             </a:r>
             <a:endParaRPr lang="en-US" sz="1200" dirty="0"/>
@@ -8903,7 +8819,7 @@
           <a:lstStyle/>
           <a:p>
             <a:r>
-              <a:rPr lang="de-DE" sz="1200" dirty="0" smtClean="0"/>
+              <a:rPr lang="de-DE" sz="1200" dirty="0"/>
               <a:t>c3</a:t>
             </a:r>
             <a:endParaRPr lang="en-US" sz="1200" dirty="0"/>
@@ -8935,7 +8851,7 @@
           <a:lstStyle/>
           <a:p>
             <a:r>
-              <a:rPr lang="de-DE" sz="1200" dirty="0" smtClean="0"/>
+              <a:rPr lang="de-DE" sz="1200" dirty="0"/>
               <a:t>a1.4</a:t>
             </a:r>
             <a:endParaRPr lang="en-US" sz="1200" dirty="0"/>
@@ -8967,7 +8883,7 @@
           <a:lstStyle/>
           <a:p>
             <a:r>
-              <a:rPr lang="de-DE" sz="1200" dirty="0" smtClean="0"/>
+              <a:rPr lang="de-DE" sz="1200" dirty="0"/>
               <a:t>a2.4</a:t>
             </a:r>
             <a:endParaRPr lang="en-US" sz="1200" dirty="0"/>
@@ -8999,7 +8915,7 @@
           <a:lstStyle/>
           <a:p>
             <a:r>
-              <a:rPr lang="de-DE" sz="1200" dirty="0" smtClean="0"/>
+              <a:rPr lang="de-DE" sz="1200" dirty="0"/>
               <a:t>a3.4</a:t>
             </a:r>
             <a:endParaRPr lang="en-US" sz="1200" dirty="0"/>
@@ -9031,7 +8947,7 @@
           <a:lstStyle/>
           <a:p>
             <a:r>
-              <a:rPr lang="de-DE" sz="1200" dirty="0" smtClean="0"/>
+              <a:rPr lang="de-DE" sz="1200" dirty="0"/>
               <a:t>a3.5</a:t>
             </a:r>
             <a:endParaRPr lang="en-US" sz="1200" dirty="0"/>
@@ -9063,7 +8979,7 @@
           <a:lstStyle/>
           <a:p>
             <a:r>
-              <a:rPr lang="de-DE" sz="1200" dirty="0" smtClean="0"/>
+              <a:rPr lang="de-DE" sz="1200" dirty="0"/>
               <a:t>a2.5</a:t>
             </a:r>
             <a:endParaRPr lang="en-US" sz="1200" dirty="0"/>
@@ -9095,7 +9011,7 @@
           <a:lstStyle/>
           <a:p>
             <a:r>
-              <a:rPr lang="de-DE" sz="1200" dirty="0" smtClean="0"/>
+              <a:rPr lang="de-DE" sz="1200" dirty="0"/>
               <a:t>a1.5</a:t>
             </a:r>
             <a:endParaRPr lang="en-US" sz="1200" dirty="0"/>
@@ -9189,7 +9105,7 @@
             <a:lstStyle/>
             <a:p>
               <a:r>
-                <a:rPr lang="en-US" sz="1050" dirty="0" smtClean="0">
+                <a:rPr lang="en-US" sz="1050" dirty="0">
                   <a:solidFill>
                     <a:schemeClr val="tx1"/>
                   </a:solidFill>
@@ -9198,13 +9114,6 @@
                 </a:rPr>
                 <a:t>Positive Effect</a:t>
               </a:r>
-              <a:endParaRPr lang="en-US" sz="1050" dirty="0">
-                <a:solidFill>
-                  <a:schemeClr val="tx1"/>
-                </a:solidFill>
-                <a:latin typeface="Arial" panose="020B0604020202020204" pitchFamily="34" charset="0"/>
-                <a:cs typeface="Arial" panose="020B0604020202020204" pitchFamily="34" charset="0"/>
-              </a:endParaRPr>
             </a:p>
           </p:txBody>
         </p:sp>
@@ -9297,7 +9206,7 @@
             <a:lstStyle/>
             <a:p>
               <a:r>
-                <a:rPr lang="en-US" sz="1050" dirty="0" smtClean="0">
+                <a:rPr lang="en-US" sz="1050" dirty="0">
                   <a:solidFill>
                     <a:schemeClr val="tx1"/>
                   </a:solidFill>
@@ -9306,13 +9215,6 @@
                 </a:rPr>
                 <a:t>Negative Effect</a:t>
               </a:r>
-              <a:endParaRPr lang="en-US" sz="1050" dirty="0">
-                <a:solidFill>
-                  <a:schemeClr val="tx1"/>
-                </a:solidFill>
-                <a:latin typeface="Arial" panose="020B0604020202020204" pitchFamily="34" charset="0"/>
-                <a:cs typeface="Arial" panose="020B0604020202020204" pitchFamily="34" charset="0"/>
-              </a:endParaRPr>
             </a:p>
           </p:txBody>
         </p:sp>
@@ -9405,7 +9307,7 @@
             <a:lstStyle/>
             <a:p>
               <a:r>
-                <a:rPr lang="en-US" sz="1050" dirty="0" smtClean="0">
+                <a:rPr lang="en-US" sz="1050" dirty="0">
                   <a:solidFill>
                     <a:schemeClr val="tx1"/>
                   </a:solidFill>
@@ -9414,13 +9316,6 @@
                 </a:rPr>
                 <a:t>Research Question</a:t>
               </a:r>
-              <a:endParaRPr lang="en-US" sz="1050" dirty="0">
-                <a:solidFill>
-                  <a:schemeClr val="tx1"/>
-                </a:solidFill>
-                <a:latin typeface="Arial" panose="020B0604020202020204" pitchFamily="34" charset="0"/>
-                <a:cs typeface="Arial" panose="020B0604020202020204" pitchFamily="34" charset="0"/>
-              </a:endParaRPr>
             </a:p>
           </p:txBody>
         </p:sp>
@@ -9471,7 +9366,7 @@
           <a:p>
             <a:pPr algn="ctr"/>
             <a:r>
-              <a:rPr lang="en-US" sz="1200" dirty="0" err="1" smtClean="0">
+              <a:rPr lang="en-US" sz="1200" dirty="0" err="1">
                 <a:solidFill>
                   <a:schemeClr val="tx1"/>
                 </a:solidFill>
@@ -9601,7 +9496,7 @@
           <a:p>
             <a:pPr algn="ctr"/>
             <a:r>
-              <a:rPr lang="de-DE" sz="1200" dirty="0" smtClean="0">
+              <a:rPr lang="de-DE" sz="1200" dirty="0">
                 <a:solidFill>
                   <a:schemeClr val="tx1"/>
                 </a:solidFill>
@@ -9666,7 +9561,7 @@
           <a:p>
             <a:pPr algn="ctr"/>
             <a:r>
-              <a:rPr lang="de-DE" sz="1200" dirty="0" smtClean="0">
+              <a:rPr lang="de-DE" sz="1200" dirty="0">
                 <a:solidFill>
                   <a:schemeClr val="tx1"/>
                 </a:solidFill>
@@ -9731,7 +9626,7 @@
           <a:p>
             <a:pPr algn="ctr"/>
             <a:r>
-              <a:rPr lang="de-DE" sz="1200" dirty="0" smtClean="0">
+              <a:rPr lang="de-DE" sz="1200" dirty="0">
                 <a:solidFill>
                   <a:schemeClr val="tx1"/>
                 </a:solidFill>
@@ -9796,7 +9691,7 @@
           <a:p>
             <a:pPr algn="ctr"/>
             <a:r>
-              <a:rPr lang="de-DE" sz="1200" dirty="0" smtClean="0">
+              <a:rPr lang="de-DE" sz="1200" dirty="0">
                 <a:solidFill>
                   <a:schemeClr val="tx1"/>
                 </a:solidFill>
@@ -9825,13 +9720,6 @@
   <p:clrMapOvr>
     <a:masterClrMapping/>
   </p:clrMapOvr>
-  <p:timing>
-    <p:tnLst>
-      <p:par>
-        <p:cTn id="1" dur="indefinite" restart="never" nodeType="tmRoot"/>
-      </p:par>
-    </p:tnLst>
-  </p:timing>
 </p:sld>
 </file>
 
@@ -10269,7 +10157,7 @@
           <a:p>
             <a:pPr algn="ctr"/>
             <a:r>
-              <a:rPr lang="en-US" sz="1200" dirty="0" err="1" smtClean="0">
+              <a:rPr lang="en-US" sz="1200" dirty="0" err="1">
                 <a:solidFill>
                   <a:schemeClr val="tx1"/>
                 </a:solidFill>
@@ -10334,7 +10222,7 @@
           <a:p>
             <a:pPr algn="ctr"/>
             <a:r>
-              <a:rPr lang="en-US" sz="1200" dirty="0" smtClean="0">
+              <a:rPr lang="en-US" sz="1200" dirty="0">
                 <a:solidFill>
                   <a:schemeClr val="tx1"/>
                 </a:solidFill>
@@ -10343,13 +10231,6 @@
               </a:rPr>
               <a:t>Popularity Cues</a:t>
             </a:r>
-            <a:endParaRPr lang="en-US" sz="1200" dirty="0">
-              <a:solidFill>
-                <a:schemeClr val="tx1"/>
-              </a:solidFill>
-              <a:latin typeface="Arial" panose="020B0604020202020204" pitchFamily="34" charset="0"/>
-              <a:cs typeface="Arial" panose="020B0604020202020204" pitchFamily="34" charset="0"/>
-            </a:endParaRPr>
           </a:p>
         </p:txBody>
       </p:sp>
@@ -10399,7 +10280,7 @@
           <a:p>
             <a:pPr algn="ctr"/>
             <a:r>
-              <a:rPr lang="de-DE" sz="1200" dirty="0" smtClean="0">
+              <a:rPr lang="de-DE" sz="1200" dirty="0">
                 <a:solidFill>
                   <a:schemeClr val="tx1"/>
                 </a:solidFill>
@@ -10464,7 +10345,7 @@
           <a:p>
             <a:pPr algn="ctr"/>
             <a:r>
-              <a:rPr lang="de-DE" sz="1200" dirty="0" smtClean="0">
+              <a:rPr lang="de-DE" sz="1200" dirty="0">
                 <a:solidFill>
                   <a:schemeClr val="tx1"/>
                 </a:solidFill>
@@ -10524,7 +10405,7 @@
           </a:lstStyle>
           <a:p>
             <a:r>
-              <a:rPr lang="de-DE" dirty="0" smtClean="0"/>
+              <a:rPr lang="de-DE" dirty="0"/>
               <a:t>H5</a:t>
             </a:r>
             <a:endParaRPr lang="en-US" dirty="0"/>
@@ -10577,7 +10458,7 @@
           <a:p>
             <a:pPr algn="ctr"/>
             <a:r>
-              <a:rPr lang="de-DE" sz="1200" dirty="0" smtClean="0">
+              <a:rPr lang="de-DE" sz="1200" dirty="0">
                 <a:solidFill>
                   <a:schemeClr val="tx1"/>
                 </a:solidFill>
@@ -10707,7 +10588,7 @@
           <a:p>
             <a:pPr algn="ctr"/>
             <a:r>
-              <a:rPr lang="en-US" sz="1200" dirty="0" err="1" smtClean="0">
+              <a:rPr lang="en-US" sz="1200" dirty="0" err="1">
                 <a:solidFill>
                   <a:schemeClr val="tx1"/>
                 </a:solidFill>
@@ -10810,13 +10691,6 @@
   <p:clrMapOvr>
     <a:masterClrMapping/>
   </p:clrMapOvr>
-  <p:timing>
-    <p:tnLst>
-      <p:par>
-        <p:cTn id="1" dur="indefinite" restart="never" nodeType="tmRoot"/>
-      </p:par>
-    </p:tnLst>
-  </p:timing>
 </p:sld>
 </file>
 
@@ -11254,7 +11128,7 @@
           <a:p>
             <a:pPr algn="ctr"/>
             <a:r>
-              <a:rPr lang="en-US" sz="1200" dirty="0" smtClean="0">
+              <a:rPr lang="en-US" sz="1200" dirty="0">
                 <a:solidFill>
                   <a:schemeClr val="tx1"/>
                 </a:solidFill>
@@ -11263,13 +11137,6 @@
               </a:rPr>
               <a:t>Self-Disclosure</a:t>
             </a:r>
-            <a:endParaRPr lang="en-US" sz="1200" dirty="0">
-              <a:solidFill>
-                <a:schemeClr val="tx1"/>
-              </a:solidFill>
-              <a:latin typeface="Arial" panose="020B0604020202020204" pitchFamily="34" charset="0"/>
-              <a:cs typeface="Arial" panose="020B0604020202020204" pitchFamily="34" charset="0"/>
-            </a:endParaRPr>
           </a:p>
         </p:txBody>
       </p:sp>
@@ -11319,7 +11186,7 @@
           <a:p>
             <a:pPr algn="ctr"/>
             <a:r>
-              <a:rPr lang="en-US" sz="1200" dirty="0" smtClean="0">
+              <a:rPr lang="en-US" sz="1200" dirty="0">
                 <a:solidFill>
                   <a:schemeClr val="tx1"/>
                 </a:solidFill>
@@ -11328,13 +11195,6 @@
               </a:rPr>
               <a:t>Popularity Cues</a:t>
             </a:r>
-            <a:endParaRPr lang="en-US" sz="1200" dirty="0">
-              <a:solidFill>
-                <a:schemeClr val="tx1"/>
-              </a:solidFill>
-              <a:latin typeface="Arial" panose="020B0604020202020204" pitchFamily="34" charset="0"/>
-              <a:cs typeface="Arial" panose="020B0604020202020204" pitchFamily="34" charset="0"/>
-            </a:endParaRPr>
           </a:p>
         </p:txBody>
       </p:sp>
@@ -11384,7 +11244,7 @@
           <a:p>
             <a:pPr algn="ctr"/>
             <a:r>
-              <a:rPr lang="de-DE" sz="1200" dirty="0" err="1" smtClean="0">
+              <a:rPr lang="de-DE" sz="1200" dirty="0" err="1">
                 <a:solidFill>
                   <a:schemeClr val="tx1"/>
                 </a:solidFill>
@@ -11449,14 +11309,14 @@
           <a:p>
             <a:pPr algn="ctr"/>
             <a:r>
-              <a:rPr lang="de-DE" sz="1200" dirty="0" err="1" smtClean="0">
+              <a:rPr lang="de-DE" sz="1200">
                 <a:solidFill>
                   <a:schemeClr val="tx1"/>
                 </a:solidFill>
                 <a:latin typeface="Arial" panose="020B0604020202020204" pitchFamily="34" charset="0"/>
                 <a:cs typeface="Arial" panose="020B0604020202020204" pitchFamily="34" charset="0"/>
               </a:rPr>
-              <a:t>Gratifications</a:t>
+              <a:t>Privacy Concerns</a:t>
             </a:r>
             <a:endParaRPr lang="en-US" sz="1200" dirty="0">
               <a:solidFill>
@@ -11509,7 +11369,7 @@
           </a:lstStyle>
           <a:p>
             <a:r>
-              <a:rPr lang="de-DE" dirty="0" smtClean="0"/>
+              <a:rPr lang="de-DE" dirty="0"/>
               <a:t>H5</a:t>
             </a:r>
             <a:endParaRPr lang="en-US" dirty="0"/>
@@ -11562,24 +11422,14 @@
           <a:p>
             <a:pPr algn="ctr"/>
             <a:r>
-              <a:rPr lang="de-DE" sz="1200" dirty="0" smtClean="0">
+              <a:rPr lang="de-DE" sz="1200" dirty="0" err="1">
                 <a:solidFill>
                   <a:schemeClr val="tx1"/>
                 </a:solidFill>
                 <a:latin typeface="Arial" panose="020B0604020202020204" pitchFamily="34" charset="0"/>
                 <a:cs typeface="Arial" panose="020B0604020202020204" pitchFamily="34" charset="0"/>
               </a:rPr>
-              <a:t>Privacy </a:t>
-            </a:r>
-            <a:r>
-              <a:rPr lang="de-DE" sz="1200" dirty="0" err="1" smtClean="0">
-                <a:solidFill>
-                  <a:schemeClr val="tx1"/>
-                </a:solidFill>
-                <a:latin typeface="Arial" panose="020B0604020202020204" pitchFamily="34" charset="0"/>
-                <a:cs typeface="Arial" panose="020B0604020202020204" pitchFamily="34" charset="0"/>
-              </a:rPr>
-              <a:t>Concerns</a:t>
+              <a:t>Gratifications</a:t>
             </a:r>
             <a:endParaRPr lang="en-US" sz="1200" dirty="0">
               <a:solidFill>
@@ -11637,7 +11487,7 @@
           <a:p>
             <a:pPr algn="ctr"/>
             <a:r>
-              <a:rPr lang="de-DE" sz="1200" dirty="0" smtClean="0">
+              <a:rPr lang="de-DE" sz="1200" dirty="0">
                 <a:solidFill>
                   <a:schemeClr val="tx1"/>
                 </a:solidFill>
@@ -11702,7 +11552,7 @@
           <a:p>
             <a:pPr algn="ctr"/>
             <a:r>
-              <a:rPr lang="en-US" sz="1200" dirty="0" smtClean="0">
+              <a:rPr lang="en-US" sz="1200" dirty="0">
                 <a:solidFill>
                   <a:schemeClr val="tx1"/>
                 </a:solidFill>
@@ -11711,13 +11561,6 @@
               </a:rPr>
               <a:t>Privacy Deliberation</a:t>
             </a:r>
-            <a:endParaRPr lang="en-US" sz="1200" dirty="0">
-              <a:solidFill>
-                <a:schemeClr val="tx1"/>
-              </a:solidFill>
-              <a:latin typeface="Arial" panose="020B0604020202020204" pitchFamily="34" charset="0"/>
-              <a:cs typeface="Arial" panose="020B0604020202020204" pitchFamily="34" charset="0"/>
-            </a:endParaRPr>
           </a:p>
         </p:txBody>
       </p:sp>
@@ -11805,13 +11648,6 @@
   <p:clrMapOvr>
     <a:masterClrMapping/>
   </p:clrMapOvr>
-  <p:timing>
-    <p:tnLst>
-      <p:par>
-        <p:cTn id="1" dur="indefinite" restart="never" nodeType="tmRoot"/>
-      </p:par>
-    </p:tnLst>
-  </p:timing>
 </p:sld>
 </file>
 
@@ -11877,7 +11713,7 @@
           <a:p>
             <a:pPr algn="ctr"/>
             <a:r>
-              <a:rPr lang="en-US" sz="1200" dirty="0" smtClean="0">
+              <a:rPr lang="en-US" sz="1200" dirty="0">
                 <a:solidFill>
                   <a:schemeClr val="tx1"/>
                 </a:solidFill>
@@ -11886,13 +11722,6 @@
               </a:rPr>
               <a:t>Communication</a:t>
             </a:r>
-            <a:endParaRPr lang="en-US" sz="1200" dirty="0">
-              <a:solidFill>
-                <a:schemeClr val="tx1"/>
-              </a:solidFill>
-              <a:latin typeface="Arial" panose="020B0604020202020204" pitchFamily="34" charset="0"/>
-              <a:cs typeface="Arial" panose="020B0604020202020204" pitchFamily="34" charset="0"/>
-            </a:endParaRPr>
           </a:p>
         </p:txBody>
       </p:sp>
@@ -11941,7 +11770,7 @@
           <a:p>
             <a:pPr algn="ctr"/>
             <a:r>
-              <a:rPr lang="en-US" sz="1200" dirty="0" smtClean="0">
+              <a:rPr lang="en-US" sz="1200" dirty="0">
                 <a:solidFill>
                   <a:schemeClr val="tx1"/>
                 </a:solidFill>
@@ -11954,7 +11783,7 @@
           <a:p>
             <a:pPr algn="ctr"/>
             <a:r>
-              <a:rPr lang="en-US" sz="1200" dirty="0" smtClean="0">
+              <a:rPr lang="en-US" sz="1200" dirty="0">
                 <a:solidFill>
                   <a:schemeClr val="tx1"/>
                 </a:solidFill>
@@ -11963,13 +11792,6 @@
               </a:rPr>
               <a:t>No Buttons</a:t>
             </a:r>
-            <a:endParaRPr lang="en-US" sz="1200" dirty="0">
-              <a:solidFill>
-                <a:schemeClr val="tx1"/>
-              </a:solidFill>
-              <a:latin typeface="Arial" panose="020B0604020202020204" pitchFamily="34" charset="0"/>
-              <a:cs typeface="Arial" panose="020B0604020202020204" pitchFamily="34" charset="0"/>
-            </a:endParaRPr>
           </a:p>
         </p:txBody>
       </p:sp>
@@ -12238,7 +12060,7 @@
           <a:p>
             <a:pPr algn="ctr"/>
             <a:r>
-              <a:rPr lang="de-DE" sz="1200" dirty="0" smtClean="0">
+              <a:rPr lang="de-DE" sz="1200" dirty="0">
                 <a:solidFill>
                   <a:schemeClr val="tx1"/>
                 </a:solidFill>
@@ -12341,7 +12163,7 @@
           </a:lstStyle>
           <a:p>
             <a:r>
-              <a:rPr lang="de-DE" dirty="0" smtClean="0"/>
+              <a:rPr lang="de-DE" dirty="0"/>
               <a:t>H5</a:t>
             </a:r>
             <a:endParaRPr lang="en-US" dirty="0"/>
@@ -12393,7 +12215,7 @@
           <a:p>
             <a:pPr algn="ctr"/>
             <a:r>
-              <a:rPr lang="de-DE" sz="1200" dirty="0" smtClean="0">
+              <a:rPr lang="de-DE" sz="1200" dirty="0">
                 <a:solidFill>
                   <a:schemeClr val="tx1"/>
                 </a:solidFill>
@@ -12403,16 +12225,6 @@
               <a:t>Communication </a:t>
             </a:r>
             <a:r>
-              <a:rPr lang="de-DE" sz="1200" dirty="0" err="1" smtClean="0">
-                <a:solidFill>
-                  <a:schemeClr val="tx1"/>
-                </a:solidFill>
-                <a:latin typeface="Arial" panose="020B0604020202020204" pitchFamily="34" charset="0"/>
-                <a:cs typeface="Arial" panose="020B0604020202020204" pitchFamily="34" charset="0"/>
-              </a:rPr>
-              <a:t>Self</a:t>
-            </a:r>
-            <a:r>
               <a:rPr lang="de-DE" sz="1200" dirty="0" err="1">
                 <a:solidFill>
                   <a:schemeClr val="tx1"/>
@@ -12420,17 +12232,7 @@
                 <a:latin typeface="Arial" panose="020B0604020202020204" pitchFamily="34" charset="0"/>
                 <a:cs typeface="Arial" panose="020B0604020202020204" pitchFamily="34" charset="0"/>
               </a:rPr>
-              <a:t>-</a:t>
-            </a:r>
-            <a:r>
-              <a:rPr lang="de-DE" sz="1200" dirty="0" err="1" smtClean="0">
-                <a:solidFill>
-                  <a:schemeClr val="tx1"/>
-                </a:solidFill>
-                <a:latin typeface="Arial" panose="020B0604020202020204" pitchFamily="34" charset="0"/>
-                <a:cs typeface="Arial" panose="020B0604020202020204" pitchFamily="34" charset="0"/>
-              </a:rPr>
-              <a:t>Efficacy</a:t>
+              <a:t>Self-Efficacy</a:t>
             </a:r>
             <a:endParaRPr lang="en-US" sz="1200" dirty="0">
               <a:solidFill>
@@ -12565,7 +12367,7 @@
           <a:p>
             <a:pPr algn="ctr"/>
             <a:r>
-              <a:rPr lang="de-DE" sz="1200" dirty="0" err="1" smtClean="0">
+              <a:rPr lang="de-DE" sz="1200" dirty="0" err="1">
                 <a:solidFill>
                   <a:schemeClr val="tx1"/>
                 </a:solidFill>
@@ -12668,7 +12470,7 @@
           <a:p>
             <a:pPr algn="ctr"/>
             <a:r>
-              <a:rPr lang="de-DE" sz="1200" dirty="0" smtClean="0">
+              <a:rPr lang="de-DE" sz="1200" dirty="0">
                 <a:solidFill>
                   <a:schemeClr val="tx1"/>
                 </a:solidFill>
@@ -12831,7 +12633,7 @@
           <a:lstStyle/>
           <a:p>
             <a:r>
-              <a:rPr lang="de-DE" sz="1200" dirty="0" smtClean="0"/>
+              <a:rPr lang="de-DE" sz="1200" dirty="0"/>
               <a:t>b1</a:t>
             </a:r>
             <a:endParaRPr lang="en-US" sz="1200" dirty="0"/>
@@ -12863,7 +12665,7 @@
           <a:lstStyle/>
           <a:p>
             <a:r>
-              <a:rPr lang="de-DE" sz="1200" dirty="0" smtClean="0"/>
+              <a:rPr lang="de-DE" sz="1200" dirty="0"/>
               <a:t>b5</a:t>
             </a:r>
             <a:endParaRPr lang="en-US" sz="1200" dirty="0"/>
@@ -12895,7 +12697,7 @@
           <a:lstStyle/>
           <a:p>
             <a:r>
-              <a:rPr lang="de-DE" sz="1200" dirty="0" smtClean="0"/>
+              <a:rPr lang="de-DE" sz="1200" dirty="0"/>
               <a:t>b4</a:t>
             </a:r>
             <a:endParaRPr lang="en-US" sz="1200" dirty="0"/>
@@ -12927,7 +12729,7 @@
           <a:lstStyle/>
           <a:p>
             <a:r>
-              <a:rPr lang="de-DE" sz="1200" dirty="0" smtClean="0"/>
+              <a:rPr lang="de-DE" sz="1200" dirty="0"/>
               <a:t>b3</a:t>
             </a:r>
             <a:endParaRPr lang="en-US" sz="1200" dirty="0"/>
@@ -12959,7 +12761,7 @@
           <a:lstStyle/>
           <a:p>
             <a:r>
-              <a:rPr lang="de-DE" sz="1200" dirty="0" smtClean="0"/>
+              <a:rPr lang="de-DE" sz="1200" dirty="0"/>
               <a:t>b2</a:t>
             </a:r>
             <a:endParaRPr lang="en-US" sz="1200" dirty="0"/>
@@ -12992,11 +12794,7 @@
           <a:p>
             <a:r>
               <a:rPr lang="de-DE" sz="1200" dirty="0"/>
-              <a:t>a</a:t>
-            </a:r>
-            <a:r>
-              <a:rPr lang="de-DE" sz="1200" dirty="0" smtClean="0"/>
-              <a:t>1</a:t>
+              <a:t>a1</a:t>
             </a:r>
             <a:endParaRPr lang="en-US" sz="1200" dirty="0"/>
           </a:p>
@@ -13028,11 +12826,7 @@
           <a:p>
             <a:r>
               <a:rPr lang="de-DE" sz="1200" dirty="0"/>
-              <a:t>a</a:t>
-            </a:r>
-            <a:r>
-              <a:rPr lang="de-DE" sz="1200" dirty="0" smtClean="0"/>
-              <a:t>5</a:t>
+              <a:t>a5</a:t>
             </a:r>
             <a:endParaRPr lang="en-US" sz="1200" dirty="0"/>
           </a:p>
@@ -13064,11 +12858,7 @@
           <a:p>
             <a:r>
               <a:rPr lang="de-DE" sz="1200" dirty="0"/>
-              <a:t>a</a:t>
-            </a:r>
-            <a:r>
-              <a:rPr lang="de-DE" sz="1200" dirty="0" smtClean="0"/>
-              <a:t>4</a:t>
+              <a:t>a4</a:t>
             </a:r>
             <a:endParaRPr lang="en-US" sz="1200" dirty="0"/>
           </a:p>
@@ -13100,11 +12890,7 @@
           <a:p>
             <a:r>
               <a:rPr lang="de-DE" sz="1200" dirty="0"/>
-              <a:t>a</a:t>
-            </a:r>
-            <a:r>
-              <a:rPr lang="de-DE" sz="1200" dirty="0" smtClean="0"/>
-              <a:t>3</a:t>
+              <a:t>a3</a:t>
             </a:r>
             <a:endParaRPr lang="en-US" sz="1200" dirty="0"/>
           </a:p>
@@ -13136,11 +12922,7 @@
           <a:p>
             <a:r>
               <a:rPr lang="de-DE" sz="1200" dirty="0"/>
-              <a:t>a</a:t>
-            </a:r>
-            <a:r>
-              <a:rPr lang="de-DE" sz="1200" dirty="0" smtClean="0"/>
-              <a:t>2</a:t>
+              <a:t>a2</a:t>
             </a:r>
             <a:endParaRPr lang="en-US" sz="1200" dirty="0"/>
           </a:p>
@@ -13171,7 +12953,7 @@
           <a:lstStyle/>
           <a:p>
             <a:r>
-              <a:rPr lang="de-DE" sz="1200" dirty="0" smtClean="0"/>
+              <a:rPr lang="de-DE" sz="1200" dirty="0"/>
               <a:t>c1</a:t>
             </a:r>
             <a:endParaRPr lang="en-US" sz="1200" dirty="0"/>
@@ -13188,13 +12970,6 @@
   <p:clrMapOvr>
     <a:masterClrMapping/>
   </p:clrMapOvr>
-  <p:timing>
-    <p:tnLst>
-      <p:par>
-        <p:cTn id="1" dur="indefinite" restart="never" nodeType="tmRoot"/>
-      </p:par>
-    </p:tnLst>
-  </p:timing>
 </p:sld>
 </file>
 

</xml_diff>